<commit_message>
Writeup to go to committee.
</commit_message>
<xml_diff>
--- a/2021-08-05-Vol-Core/Slides.pptx
+++ b/2021-08-05-Vol-Core/Slides.pptx
@@ -204,7 +204,7 @@
           <a:p>
             <a:fld id="{40C5A918-A857-8A45-9D8A-72B940001014}" type="datetimeFigureOut">
               <a:rPr lang="en-US" smtClean="0"/>
-              <a:t>8/4/21</a:t>
+              <a:t>8/9/21</a:t>
             </a:fld>
             <a:endParaRPr lang="en-US"/>
           </a:p>
@@ -684,7 +684,7 @@
           <a:p>
             <a:fld id="{15FC917A-7DC0-394D-BDE6-4CE22DE78644}" type="datetimeFigureOut">
               <a:rPr lang="en-US" smtClean="0"/>
-              <a:t>8/4/21</a:t>
+              <a:t>8/9/21</a:t>
             </a:fld>
             <a:endParaRPr lang="en-US"/>
           </a:p>
@@ -852,7 +852,7 @@
           <a:p>
             <a:fld id="{15FC917A-7DC0-394D-BDE6-4CE22DE78644}" type="datetimeFigureOut">
               <a:rPr lang="en-US" smtClean="0"/>
-              <a:t>8/4/21</a:t>
+              <a:t>8/9/21</a:t>
             </a:fld>
             <a:endParaRPr lang="en-US"/>
           </a:p>
@@ -1030,7 +1030,7 @@
           <a:p>
             <a:fld id="{15FC917A-7DC0-394D-BDE6-4CE22DE78644}" type="datetimeFigureOut">
               <a:rPr lang="en-US" smtClean="0"/>
-              <a:t>8/4/21</a:t>
+              <a:t>8/9/21</a:t>
             </a:fld>
             <a:endParaRPr lang="en-US"/>
           </a:p>
@@ -1198,7 +1198,7 @@
           <a:p>
             <a:fld id="{15FC917A-7DC0-394D-BDE6-4CE22DE78644}" type="datetimeFigureOut">
               <a:rPr lang="en-US" smtClean="0"/>
-              <a:t>8/4/21</a:t>
+              <a:t>8/9/21</a:t>
             </a:fld>
             <a:endParaRPr lang="en-US"/>
           </a:p>
@@ -1443,7 +1443,7 @@
           <a:p>
             <a:fld id="{15FC917A-7DC0-394D-BDE6-4CE22DE78644}" type="datetimeFigureOut">
               <a:rPr lang="en-US" smtClean="0"/>
-              <a:t>8/4/21</a:t>
+              <a:t>8/9/21</a:t>
             </a:fld>
             <a:endParaRPr lang="en-US"/>
           </a:p>
@@ -1672,7 +1672,7 @@
           <a:p>
             <a:fld id="{15FC917A-7DC0-394D-BDE6-4CE22DE78644}" type="datetimeFigureOut">
               <a:rPr lang="en-US" smtClean="0"/>
-              <a:t>8/4/21</a:t>
+              <a:t>8/9/21</a:t>
             </a:fld>
             <a:endParaRPr lang="en-US"/>
           </a:p>
@@ -2036,7 +2036,7 @@
           <a:p>
             <a:fld id="{15FC917A-7DC0-394D-BDE6-4CE22DE78644}" type="datetimeFigureOut">
               <a:rPr lang="en-US" smtClean="0"/>
-              <a:t>8/4/21</a:t>
+              <a:t>8/9/21</a:t>
             </a:fld>
             <a:endParaRPr lang="en-US"/>
           </a:p>
@@ -2153,7 +2153,7 @@
           <a:p>
             <a:fld id="{15FC917A-7DC0-394D-BDE6-4CE22DE78644}" type="datetimeFigureOut">
               <a:rPr lang="en-US" smtClean="0"/>
-              <a:t>8/4/21</a:t>
+              <a:t>8/9/21</a:t>
             </a:fld>
             <a:endParaRPr lang="en-US"/>
           </a:p>
@@ -2248,7 +2248,7 @@
           <a:p>
             <a:fld id="{15FC917A-7DC0-394D-BDE6-4CE22DE78644}" type="datetimeFigureOut">
               <a:rPr lang="en-US" smtClean="0"/>
-              <a:t>8/4/21</a:t>
+              <a:t>8/9/21</a:t>
             </a:fld>
             <a:endParaRPr lang="en-US"/>
           </a:p>
@@ -2523,7 +2523,7 @@
           <a:p>
             <a:fld id="{15FC917A-7DC0-394D-BDE6-4CE22DE78644}" type="datetimeFigureOut">
               <a:rPr lang="en-US" smtClean="0"/>
-              <a:t>8/4/21</a:t>
+              <a:t>8/9/21</a:t>
             </a:fld>
             <a:endParaRPr lang="en-US"/>
           </a:p>
@@ -2775,7 +2775,7 @@
           <a:p>
             <a:fld id="{15FC917A-7DC0-394D-BDE6-4CE22DE78644}" type="datetimeFigureOut">
               <a:rPr lang="en-US" smtClean="0"/>
-              <a:t>8/4/21</a:t>
+              <a:t>8/9/21</a:t>
             </a:fld>
             <a:endParaRPr lang="en-US"/>
           </a:p>
@@ -2986,7 +2986,7 @@
           <a:p>
             <a:fld id="{15FC917A-7DC0-394D-BDE6-4CE22DE78644}" type="datetimeFigureOut">
               <a:rPr lang="en-US" smtClean="0"/>
-              <a:t>8/4/21</a:t>
+              <a:t>8/9/21</a:t>
             </a:fld>
             <a:endParaRPr lang="en-US"/>
           </a:p>
@@ -4840,12 +4840,29 @@
               <a:buChar char="•"/>
             </a:pPr>
             <a:r>
+              <a:rPr lang="en-US" sz="1600" b="1" dirty="0">
+                <a:solidFill>
+                  <a:srgbClr val="FF0000"/>
+                </a:solidFill>
+                <a:latin typeface="Roboto" charset="0"/>
+                <a:ea typeface="Roboto" charset="0"/>
+                <a:cs typeface="Roboto" charset="0"/>
+              </a:rPr>
+              <a:t>Try Civil/Industrial’s approach of banging out WC  with a 1-credit 200-300 level course: ECE 395.</a:t>
+            </a:r>
+          </a:p>
+          <a:p>
+            <a:pPr marL="457200" indent="-457200">
+              <a:buFont typeface="Arial" panose="020B0604020202020204" pitchFamily="34" charset="0"/>
+              <a:buChar char="•"/>
+            </a:pPr>
+            <a:r>
               <a:rPr lang="en-US" sz="1600" dirty="0">
                 <a:latin typeface="Roboto" charset="0"/>
                 <a:ea typeface="Roboto" charset="0"/>
                 <a:cs typeface="Roboto" charset="0"/>
               </a:rPr>
-              <a:t>Keep at it with 401.  I can meet with the coordinator.  I’m not sure Dave is up to it.  The numbers make this hard.</a:t>
+              <a:t>Keep at it with 401.  I can meet with the coordinator.  Dave is pessimistic.  The numbers make this hard.</a:t>
             </a:r>
           </a:p>
           <a:p>
@@ -4860,20 +4877,6 @@
                 <a:cs typeface="Roboto" charset="0"/>
               </a:rPr>
               <a:t>Split 401 into two one-credit courses – one for WC and one for OC.  May make approval easier (thanks Doug Aaron).</a:t>
-            </a:r>
-          </a:p>
-          <a:p>
-            <a:pPr marL="457200" indent="-457200">
-              <a:buFont typeface="Arial" panose="020B0604020202020204" pitchFamily="34" charset="0"/>
-              <a:buChar char="•"/>
-            </a:pPr>
-            <a:r>
-              <a:rPr lang="en-US" sz="1600" dirty="0">
-                <a:latin typeface="Roboto" charset="0"/>
-                <a:ea typeface="Roboto" charset="0"/>
-                <a:cs typeface="Roboto" charset="0"/>
-              </a:rPr>
-              <a:t>Try Civil/Industrial’s approach of banging out WC  with a 1-credit 200-300 level course.  </a:t>
             </a:r>
           </a:p>
           <a:p>
@@ -5314,7 +5317,10 @@
               <a:buChar char="•"/>
             </a:pPr>
             <a:r>
-              <a:rPr lang="en-US" sz="1600" dirty="0">
+              <a:rPr lang="en-US" sz="1600" b="1" dirty="0">
+                <a:solidFill>
+                  <a:srgbClr val="FF0000"/>
+                </a:solidFill>
                 <a:latin typeface="Roboto" charset="0"/>
                 <a:ea typeface="Roboto" charset="0"/>
                 <a:cs typeface="Roboto" charset="0"/>
@@ -5744,7 +5750,10 @@
               <a:buChar char="•"/>
             </a:pPr>
             <a:r>
-              <a:rPr lang="en-US" sz="1600" dirty="0">
+              <a:rPr lang="en-US" sz="1600" b="1" dirty="0">
+                <a:solidFill>
+                  <a:srgbClr val="FF0000"/>
+                </a:solidFill>
                 <a:latin typeface="Roboto" charset="0"/>
                 <a:ea typeface="Roboto" charset="0"/>
                 <a:cs typeface="Roboto" charset="0"/>
@@ -5995,7 +6004,7 @@
         <p:spPr>
           <a:xfrm>
             <a:off x="171153" y="1672134"/>
-            <a:ext cx="11909243" cy="2554545"/>
+            <a:ext cx="11909243" cy="3293209"/>
           </a:xfrm>
           <a:prstGeom prst="rect">
             <a:avLst/>
@@ -6018,6 +6027,20 @@
                 <a:ea typeface="Roboto" charset="0"/>
                 <a:cs typeface="Roboto" charset="0"/>
               </a:rPr>
+              <a:t>The students get two of the three with the freshman EF courses.</a:t>
+            </a:r>
+          </a:p>
+          <a:p>
+            <a:pPr marL="457200" indent="-457200">
+              <a:buFont typeface="Arial" panose="020B0604020202020204" pitchFamily="34" charset="0"/>
+              <a:buChar char="•"/>
+            </a:pPr>
+            <a:r>
+              <a:rPr lang="en-US" sz="1600" dirty="0">
+                <a:latin typeface="Roboto" charset="0"/>
+                <a:ea typeface="Roboto" charset="0"/>
+                <a:cs typeface="Roboto" charset="0"/>
+              </a:rPr>
               <a:t>There are plenty of double-dip options: ENGL 264 (AAH), ENGL 494 (WC&amp;GCUS), PUBH 201 (SS), THEA 373 (AAH).  Only ENGL 494 has </a:t>
             </a:r>
             <a:r>
@@ -6078,12 +6101,87 @@
               <a:buChar char="•"/>
             </a:pPr>
             <a:r>
+              <a:rPr lang="en-US" sz="1600" b="1" dirty="0">
+                <a:solidFill>
+                  <a:srgbClr val="FF0000"/>
+                </a:solidFill>
+                <a:latin typeface="Roboto" charset="0"/>
+                <a:ea typeface="Roboto" charset="0"/>
+                <a:cs typeface="Roboto" charset="0"/>
+              </a:rPr>
+              <a:t>Do nothing and take a “wait and see” attitude with EI – the students can get the third EI with their other </a:t>
+            </a:r>
+            <a:r>
+              <a:rPr lang="en-US" sz="1600" b="1" dirty="0" err="1">
+                <a:solidFill>
+                  <a:srgbClr val="FF0000"/>
+                </a:solidFill>
+                <a:latin typeface="Roboto" charset="0"/>
+                <a:ea typeface="Roboto" charset="0"/>
+                <a:cs typeface="Roboto" charset="0"/>
+              </a:rPr>
+              <a:t>VolCore</a:t>
+            </a:r>
+            <a:r>
+              <a:rPr lang="en-US" sz="1600" b="1" dirty="0">
+                <a:solidFill>
+                  <a:srgbClr val="FF0000"/>
+                </a:solidFill>
+                <a:latin typeface="Roboto" charset="0"/>
+                <a:ea typeface="Roboto" charset="0"/>
+                <a:cs typeface="Roboto" charset="0"/>
+              </a:rPr>
+              <a:t> courses</a:t>
+            </a:r>
+            <a:r>
               <a:rPr lang="en-US" sz="1600" dirty="0">
                 <a:latin typeface="Roboto" charset="0"/>
                 <a:ea typeface="Roboto" charset="0"/>
                 <a:cs typeface="Roboto" charset="0"/>
               </a:rPr>
-              <a:t>Do nothing – the students can double-dip with their other </a:t>
+              <a:t>.</a:t>
+            </a:r>
+          </a:p>
+          <a:p>
+            <a:pPr marL="457200" indent="-457200">
+              <a:buFont typeface="Arial" panose="020B0604020202020204" pitchFamily="34" charset="0"/>
+              <a:buChar char="•"/>
+            </a:pPr>
+            <a:r>
+              <a:rPr lang="en-US" sz="1600" dirty="0">
+                <a:latin typeface="Roboto" charset="0"/>
+                <a:ea typeface="Roboto" charset="0"/>
+                <a:cs typeface="Roboto" charset="0"/>
+              </a:rPr>
+              <a:t>Our courses that map naturally: ECE 335 and COSC 340 – all majors would get the third EI here.</a:t>
+            </a:r>
+          </a:p>
+          <a:p>
+            <a:pPr marL="457200" indent="-457200">
+              <a:buFont typeface="Arial" panose="020B0604020202020204" pitchFamily="34" charset="0"/>
+              <a:buChar char="•"/>
+            </a:pPr>
+            <a:r>
+              <a:rPr lang="en-US" sz="1600" dirty="0">
+                <a:latin typeface="Roboto" charset="0"/>
+                <a:ea typeface="Roboto" charset="0"/>
+                <a:cs typeface="Roboto" charset="0"/>
+              </a:rPr>
+              <a:t>Another combination would be ECE 336, ECE 351 and COSC 340.</a:t>
+            </a:r>
+          </a:p>
+          <a:p>
+            <a:pPr marL="457200" indent="-457200">
+              <a:buFont typeface="Arial" panose="020B0604020202020204" pitchFamily="34" charset="0"/>
+              <a:buChar char="•"/>
+            </a:pPr>
+            <a:r>
+              <a:rPr lang="en-US" sz="1600" dirty="0">
+                <a:latin typeface="Roboto" charset="0"/>
+                <a:ea typeface="Roboto" charset="0"/>
+                <a:cs typeface="Roboto" charset="0"/>
+              </a:rPr>
+              <a:t>Or we could apply for EF for some courses, and students can either take them, or get EI via other </a:t>
             </a:r>
             <a:r>
               <a:rPr lang="en-US" sz="1600" dirty="0" err="1">
@@ -6099,35 +6197,7 @@
                 <a:ea typeface="Roboto" charset="0"/>
                 <a:cs typeface="Roboto" charset="0"/>
               </a:rPr>
-              <a:t> courses.</a:t>
-            </a:r>
-          </a:p>
-          <a:p>
-            <a:pPr marL="457200" indent="-457200">
-              <a:buFont typeface="Arial" panose="020B0604020202020204" pitchFamily="34" charset="0"/>
-              <a:buChar char="•"/>
-            </a:pPr>
-            <a:r>
-              <a:rPr lang="en-US" sz="1600" dirty="0">
-                <a:latin typeface="Roboto" charset="0"/>
-                <a:ea typeface="Roboto" charset="0"/>
-                <a:cs typeface="Roboto" charset="0"/>
-              </a:rPr>
-              <a:t>Try 402.</a:t>
-            </a:r>
-          </a:p>
-          <a:p>
-            <a:pPr marL="457200" indent="-457200">
-              <a:buFont typeface="Arial" panose="020B0604020202020204" pitchFamily="34" charset="0"/>
-              <a:buChar char="•"/>
-            </a:pPr>
-            <a:r>
-              <a:rPr lang="en-US" sz="1600" dirty="0">
-                <a:latin typeface="Roboto" charset="0"/>
-                <a:ea typeface="Roboto" charset="0"/>
-                <a:cs typeface="Roboto" charset="0"/>
-              </a:rPr>
-              <a:t>Find one or more of our courses and apply for EI.</a:t>
+              <a:t> courses:  COSC 365.  ECE 351.  COSC 469.  ECE 469.  Maybe others.  </a:t>
             </a:r>
           </a:p>
         </p:txBody>
@@ -6440,7 +6510,10 @@
               <a:buChar char="•"/>
             </a:pPr>
             <a:r>
-              <a:rPr lang="en-US" sz="1600" dirty="0">
+              <a:rPr lang="en-US" sz="1600" b="1" dirty="0">
+                <a:solidFill>
+                  <a:srgbClr val="FF0000"/>
+                </a:solidFill>
                 <a:latin typeface="Roboto" charset="0"/>
                 <a:ea typeface="Roboto" charset="0"/>
                 <a:cs typeface="Roboto" charset="0"/>

</xml_diff>